<commit_message>
updated the flash talk
</commit_message>
<xml_diff>
--- a/wiki-resources/DSW_AllHands18_FlashTalk.pptx
+++ b/wiki-resources/DSW_AllHands18_FlashTalk.pptx
@@ -2033,7 +2033,7 @@
   <p:cSld>
     <p:spTree>
       <p:nvGrpSpPr>
-        <p:cNvPr id="124" name="Shape 124"/>
+        <p:cNvPr id="126" name="Shape 126"/>
         <p:cNvGrpSpPr/>
         <p:nvPr/>
       </p:nvGrpSpPr>
@@ -2047,7 +2047,7 @@
       </p:grpSpPr>
       <p:sp>
         <p:nvSpPr>
-          <p:cNvPr id="125" name="Shape 125"/>
+          <p:cNvPr id="127" name="Shape 127"/>
           <p:cNvSpPr txBox="1"/>
           <p:nvPr>
             <p:ph idx="1" type="body"/>
@@ -2086,7 +2086,7 @@
       </p:sp>
       <p:sp>
         <p:nvSpPr>
-          <p:cNvPr id="126" name="Shape 126"/>
+          <p:cNvPr id="128" name="Shape 128"/>
           <p:cNvSpPr/>
           <p:nvPr>
             <p:ph idx="2" type="sldImg"/>
@@ -12696,9 +12696,13 @@
                   <a:schemeClr val="dk1"/>
                 </a:solidFill>
               </a:rPr>
-              <a:t>Data Stewardship Wizard</a:t>
+              <a:t>Data Stewardship Wizard </a:t>
             </a:r>
-            <a:endParaRPr b="1"/>
+            <a:r>
+              <a:rPr lang="en-US"/>
+              <a:t>(done)</a:t>
+            </a:r>
+            <a:endParaRPr i="1"/>
           </a:p>
           <a:p>
             <a:pPr indent="-330200" lvl="1" marL="800100" marR="0" rtl="0" algn="l">
@@ -12874,12 +12878,12 @@
             </a:pPr>
             <a:r>
               <a:rPr lang="en-US"/>
-              <a:t>Increase Usability: Editor, DMP Reports, Containers</a:t>
+              <a:t>Increase Usability: Editor (done), DMP Reports (WIP), Containers</a:t>
             </a:r>
             <a:endParaRPr/>
           </a:p>
           <a:p>
-            <a:pPr indent="-203200" lvl="1" marL="800100" marR="0" rtl="0" algn="l">
+            <a:pPr indent="0" lvl="0" marL="0" marR="0" rtl="0" algn="l">
               <a:lnSpc>
                 <a:spcPct val="100000"/>
               </a:lnSpc>
@@ -12889,11 +12893,6 @@
               <a:spcAft>
                 <a:spcPts val="0"/>
               </a:spcAft>
-              <a:buClr>
-                <a:schemeClr val="accent1"/>
-              </a:buClr>
-              <a:buSzPts val="2000"/>
-              <a:buFont typeface="Times"/>
               <a:buNone/>
             </a:pPr>
             <a:r>
@@ -13305,7 +13304,7 @@
             <a:tbl>
               <a:tblPr>
                 <a:noFill/>
-                <a:tableStyleId>{97B7E3A3-2FA7-4BA9-BEE4-AFC558864BB0}</a:tableStyleId>
+                <a:tableStyleId>{492DCD9D-96F9-46AF-803E-6464C15C3BBE}</a:tableStyleId>
               </a:tblPr>
               <a:tblGrid>
                 <a:gridCol w="1066175"/>
@@ -15182,7 +15181,7 @@
         </p:blipFill>
         <p:spPr>
           <a:xfrm>
-            <a:off x="6454326" y="1818850"/>
+            <a:off x="6454326" y="1742650"/>
             <a:ext cx="5414450" cy="3339225"/>
           </a:xfrm>
           <a:prstGeom prst="rect">
@@ -15202,8 +15201,8 @@
         </p:nvSpPr>
         <p:spPr>
           <a:xfrm>
-            <a:off x="6172200" y="457200"/>
-            <a:ext cx="5785500" cy="1712100"/>
+            <a:off x="6312375" y="683100"/>
+            <a:ext cx="5645400" cy="648000"/>
           </a:xfrm>
           <a:prstGeom prst="rect">
             <a:avLst/>
@@ -15229,7 +15228,7 @@
               <a:buNone/>
             </a:pPr>
             <a:r>
-              <a:rPr lang="en-US" sz="3000" u="sng">
+              <a:rPr lang="en-US" sz="2400" u="sng">
                 <a:solidFill>
                   <a:schemeClr val="hlink"/>
                 </a:solidFill>
@@ -15239,21 +15238,37 @@
                 <a:sym typeface="Corbel"/>
                 <a:hlinkClick r:id="rId4"/>
               </a:rPr>
-              <a:t>https://dws.fairdata.solutions</a:t>
+              <a:t>https://dsw.fairdata.solutions</a:t>
             </a:r>
+            <a:endParaRPr sz="2400">
+              <a:solidFill>
+                <a:schemeClr val="dk1"/>
+              </a:solidFill>
+              <a:latin typeface="Corbel"/>
+              <a:ea typeface="Corbel"/>
+              <a:cs typeface="Corbel"/>
+              <a:sym typeface="Corbel"/>
+            </a:endParaRPr>
+          </a:p>
+          <a:p>
+            <a:pPr indent="0" lvl="0" marL="152400" rtl="0" algn="l">
+              <a:spcBef>
+                <a:spcPts val="0"/>
+              </a:spcBef>
+              <a:spcAft>
+                <a:spcPts val="0"/>
+              </a:spcAft>
+              <a:buClr>
+                <a:schemeClr val="dk1"/>
+              </a:buClr>
+              <a:buSzPts val="1100"/>
+              <a:buFont typeface="Arial"/>
+              <a:buNone/>
+            </a:pPr>
             <a:r>
-              <a:rPr lang="en-US" sz="3000">
-                <a:solidFill>
-                  <a:schemeClr val="dk1"/>
-                </a:solidFill>
-                <a:latin typeface="Corbel"/>
-                <a:ea typeface="Corbel"/>
-                <a:cs typeface="Corbel"/>
-                <a:sym typeface="Corbel"/>
-              </a:rPr>
-              <a:t> </a:t>
+              <a:t/>
             </a:r>
-            <a:endParaRPr sz="3000">
+            <a:endParaRPr sz="2400">
               <a:solidFill>
                 <a:schemeClr val="dk1"/>
               </a:solidFill>
@@ -15510,7 +15525,171 @@
               <a:rPr lang="en-US" sz="1800"/>
               <a:t>hands-on for those who want to deploy their local instance of Wizard</a:t>
             </a:r>
+            <a:br>
+              <a:rPr lang="en-US" sz="1800"/>
+            </a:br>
             <a:endParaRPr sz="1800"/>
+          </a:p>
+          <a:p>
+            <a:pPr indent="-342900" lvl="0" marL="457200" marR="0" rtl="0" algn="l">
+              <a:lnSpc>
+                <a:spcPct val="100000"/>
+              </a:lnSpc>
+              <a:spcBef>
+                <a:spcPts val="0"/>
+              </a:spcBef>
+              <a:spcAft>
+                <a:spcPts val="0"/>
+              </a:spcAft>
+              <a:buSzPts val="1800"/>
+              <a:buChar char="•"/>
+            </a:pPr>
+            <a:r>
+              <a:rPr lang="en-US" sz="1800"/>
+              <a:t>Track the progress: </a:t>
+            </a:r>
+            <a:endParaRPr sz="1800"/>
+          </a:p>
+        </p:txBody>
+      </p:sp>
+      <p:sp>
+        <p:nvSpPr>
+          <p:cNvPr id="124" name="Shape 124"/>
+          <p:cNvSpPr txBox="1"/>
+          <p:nvPr/>
+        </p:nvSpPr>
+        <p:spPr>
+          <a:xfrm>
+            <a:off x="6170325" y="967075"/>
+            <a:ext cx="5945400" cy="963300"/>
+          </a:xfrm>
+          <a:prstGeom prst="rect">
+            <a:avLst/>
+          </a:prstGeom>
+          <a:noFill/>
+          <a:ln>
+            <a:noFill/>
+          </a:ln>
+        </p:spPr>
+        <p:txBody>
+          <a:bodyPr anchorCtr="0" anchor="ctr" bIns="91425" lIns="91425" spcFirstLastPara="1" rIns="91425" wrap="square" tIns="91425">
+            <a:noAutofit/>
+          </a:bodyPr>
+          <a:lstStyle/>
+          <a:p>
+            <a:pPr indent="0" lvl="0" marL="152400" rtl="0" algn="ctr">
+              <a:spcBef>
+                <a:spcPts val="0"/>
+              </a:spcBef>
+              <a:spcAft>
+                <a:spcPts val="0"/>
+              </a:spcAft>
+              <a:buNone/>
+            </a:pPr>
+            <a:r>
+              <a:rPr lang="en-US" sz="1800" u="sng">
+                <a:solidFill>
+                  <a:schemeClr val="hlink"/>
+                </a:solidFill>
+                <a:latin typeface="Corbel"/>
+                <a:ea typeface="Corbel"/>
+                <a:cs typeface="Corbel"/>
+                <a:sym typeface="Corbel"/>
+                <a:hlinkClick r:id="rId5"/>
+              </a:rPr>
+              <a:t>https://github.com/orgs/DataStewardshipWizard</a:t>
+            </a:r>
+            <a:endParaRPr sz="1800">
+              <a:solidFill>
+                <a:schemeClr val="dk1"/>
+              </a:solidFill>
+              <a:latin typeface="Corbel"/>
+              <a:ea typeface="Corbel"/>
+              <a:cs typeface="Corbel"/>
+              <a:sym typeface="Corbel"/>
+            </a:endParaRPr>
+          </a:p>
+          <a:p>
+            <a:pPr indent="0" lvl="0" marL="152400" rtl="0">
+              <a:spcBef>
+                <a:spcPts val="0"/>
+              </a:spcBef>
+              <a:spcAft>
+                <a:spcPts val="0"/>
+              </a:spcAft>
+              <a:buNone/>
+            </a:pPr>
+            <a:r>
+              <a:t/>
+            </a:r>
+            <a:endParaRPr sz="1800">
+              <a:solidFill>
+                <a:schemeClr val="dk1"/>
+              </a:solidFill>
+              <a:latin typeface="Corbel"/>
+              <a:ea typeface="Corbel"/>
+              <a:cs typeface="Corbel"/>
+              <a:sym typeface="Corbel"/>
+            </a:endParaRPr>
+          </a:p>
+        </p:txBody>
+      </p:sp>
+      <p:sp>
+        <p:nvSpPr>
+          <p:cNvPr id="125" name="Shape 125"/>
+          <p:cNvSpPr txBox="1"/>
+          <p:nvPr/>
+        </p:nvSpPr>
+        <p:spPr>
+          <a:xfrm>
+            <a:off x="2642545" y="5190438"/>
+            <a:ext cx="5945400" cy="963300"/>
+          </a:xfrm>
+          <a:prstGeom prst="rect">
+            <a:avLst/>
+          </a:prstGeom>
+          <a:noFill/>
+          <a:ln>
+            <a:noFill/>
+          </a:ln>
+        </p:spPr>
+        <p:txBody>
+          <a:bodyPr anchorCtr="0" anchor="ctr" bIns="91425" lIns="91425" spcFirstLastPara="1" rIns="91425" wrap="square" tIns="91425">
+            <a:noAutofit/>
+          </a:bodyPr>
+          <a:lstStyle/>
+          <a:p>
+            <a:pPr indent="-190500" lvl="0" marL="342900" rtl="0">
+              <a:spcBef>
+                <a:spcPts val="0"/>
+              </a:spcBef>
+              <a:spcAft>
+                <a:spcPts val="0"/>
+              </a:spcAft>
+              <a:buNone/>
+            </a:pPr>
+            <a:r>
+              <a:rPr lang="en-US" sz="1800" u="sng">
+                <a:solidFill>
+                  <a:schemeClr val="hlink"/>
+                </a:solidFill>
+                <a:latin typeface="Corbel"/>
+                <a:ea typeface="Corbel"/>
+                <a:cs typeface="Corbel"/>
+                <a:sym typeface="Corbel"/>
+                <a:hlinkClick r:id="rId6"/>
+              </a:rPr>
+              <a:t>https://github.com/orgs/DataStewardshipWizard/projects</a:t>
+            </a:r>
+            <a:endParaRPr sz="1800">
+              <a:solidFill>
+                <a:schemeClr val="dk1"/>
+              </a:solidFill>
+              <a:latin typeface="Corbel"/>
+              <a:ea typeface="Corbel"/>
+              <a:cs typeface="Corbel"/>
+              <a:sym typeface="Corbel"/>
+            </a:endParaRPr>
           </a:p>
         </p:txBody>
       </p:sp>
@@ -15527,7 +15706,7 @@
   <p:cSld>
     <p:spTree>
       <p:nvGrpSpPr>
-        <p:cNvPr id="127" name="Shape 127"/>
+        <p:cNvPr id="129" name="Shape 129"/>
         <p:cNvGrpSpPr/>
         <p:nvPr/>
       </p:nvGrpSpPr>
@@ -15541,7 +15720,7 @@
       </p:grpSpPr>
       <p:sp>
         <p:nvSpPr>
-          <p:cNvPr id="128" name="Shape 128"/>
+          <p:cNvPr id="130" name="Shape 130"/>
           <p:cNvSpPr txBox="1"/>
           <p:nvPr>
             <p:ph type="title"/>
@@ -15593,7 +15772,7 @@
       </p:sp>
       <p:sp>
         <p:nvSpPr>
-          <p:cNvPr id="129" name="Shape 129"/>
+          <p:cNvPr id="131" name="Shape 131"/>
           <p:cNvSpPr txBox="1"/>
           <p:nvPr>
             <p:ph idx="1" type="body"/>
@@ -15867,7 +16046,7 @@
       </p:sp>
       <p:sp>
         <p:nvSpPr>
-          <p:cNvPr id="130" name="Shape 130"/>
+          <p:cNvPr id="132" name="Shape 132"/>
           <p:cNvSpPr txBox="1"/>
           <p:nvPr>
             <p:ph idx="11" type="ftr"/>
@@ -15927,7 +16106,7 @@
       </p:sp>
       <p:pic>
         <p:nvPicPr>
-          <p:cNvPr id="131" name="Shape 131"/>
+          <p:cNvPr id="133" name="Shape 133"/>
           <p:cNvPicPr preferRelativeResize="0"/>
           <p:nvPr/>
         </p:nvPicPr>
@@ -15955,7 +16134,7 @@
       </p:pic>
       <p:sp>
         <p:nvSpPr>
-          <p:cNvPr id="132" name="Shape 132"/>
+          <p:cNvPr id="134" name="Shape 134"/>
           <p:cNvSpPr txBox="1"/>
           <p:nvPr/>
         </p:nvSpPr>
@@ -16312,6 +16491,285 @@
 </file>
 
 <file path=ppt/theme/theme2.xml><?xml version="1.0" encoding="utf-8"?>
+<a:theme xmlns:a="http://schemas.openxmlformats.org/drawingml/2006/main" xmlns:r="http://schemas.openxmlformats.org/officeDocument/2006/relationships" name="ELIXIR_template">
+  <a:themeElements>
+    <a:clrScheme name="Executive">
+      <a:dk1>
+        <a:srgbClr val="000000"/>
+      </a:dk1>
+      <a:lt1>
+        <a:srgbClr val="FFFFFF"/>
+      </a:lt1>
+      <a:dk2>
+        <a:srgbClr val="2F5897"/>
+      </a:dk2>
+      <a:lt2>
+        <a:srgbClr val="E4E9EF"/>
+      </a:lt2>
+      <a:accent1>
+        <a:srgbClr val="6076B4"/>
+      </a:accent1>
+      <a:accent2>
+        <a:srgbClr val="9C5252"/>
+      </a:accent2>
+      <a:accent3>
+        <a:srgbClr val="E68422"/>
+      </a:accent3>
+      <a:accent4>
+        <a:srgbClr val="846648"/>
+      </a:accent4>
+      <a:accent5>
+        <a:srgbClr val="63891F"/>
+      </a:accent5>
+      <a:accent6>
+        <a:srgbClr val="758085"/>
+      </a:accent6>
+      <a:hlink>
+        <a:srgbClr val="3399FF"/>
+      </a:hlink>
+      <a:folHlink>
+        <a:srgbClr val="B2B2B2"/>
+      </a:folHlink>
+    </a:clrScheme>
+    <a:fontScheme name="Office">
+      <a:majorFont>
+        <a:latin typeface="Arial"/>
+        <a:ea typeface=""/>
+        <a:cs typeface=""/>
+        <a:font script="Jpan" typeface="ＭＳ Ｐゴシック"/>
+        <a:font script="Hang" typeface="맑은 고딕"/>
+        <a:font script="Hans" typeface="宋体"/>
+        <a:font script="Hant" typeface="新細明體"/>
+        <a:font script="Arab" typeface="Times New Roman"/>
+        <a:font script="Hebr" typeface="Times New Roman"/>
+        <a:font script="Thai" typeface="Angsana New"/>
+        <a:font script="Ethi" typeface="Nyala"/>
+        <a:font script="Beng" typeface="Vrinda"/>
+        <a:font script="Gujr" typeface="Shruti"/>
+        <a:font script="Khmr" typeface="MoolBoran"/>
+        <a:font script="Knda" typeface="Tunga"/>
+        <a:font script="Guru" typeface="Raavi"/>
+        <a:font script="Cans" typeface="Euphemia"/>
+        <a:font script="Cher" typeface="Plantagenet Cherokee"/>
+        <a:font script="Yiii" typeface="Microsoft Yi Baiti"/>
+        <a:font script="Tibt" typeface="Microsoft Himalaya"/>
+        <a:font script="Thaa" typeface="MV Boli"/>
+        <a:font script="Deva" typeface="Mangal"/>
+        <a:font script="Telu" typeface="Gautami"/>
+        <a:font script="Taml" typeface="Latha"/>
+        <a:font script="Syrc" typeface="Estrangelo Edessa"/>
+        <a:font script="Orya" typeface="Kalinga"/>
+        <a:font script="Mlym" typeface="Kartika"/>
+        <a:font script="Laoo" typeface="DokChampa"/>
+        <a:font script="Sinh" typeface="Iskoola Pota"/>
+        <a:font script="Mong" typeface="Mongolian Baiti"/>
+        <a:font script="Viet" typeface="Times New Roman"/>
+        <a:font script="Uigh" typeface="Microsoft Uighur"/>
+        <a:font script="Geor" typeface="Sylfaen"/>
+      </a:majorFont>
+      <a:minorFont>
+        <a:latin typeface="Arial"/>
+        <a:ea typeface=""/>
+        <a:cs typeface=""/>
+        <a:font script="Jpan" typeface="ＭＳ Ｐゴシック"/>
+        <a:font script="Hang" typeface="맑은 고딕"/>
+        <a:font script="Hans" typeface="宋体"/>
+        <a:font script="Hant" typeface="新細明體"/>
+        <a:font script="Arab" typeface="Arial"/>
+        <a:font script="Hebr" typeface="Arial"/>
+        <a:font script="Thai" typeface="Cordia New"/>
+        <a:font script="Ethi" typeface="Nyala"/>
+        <a:font script="Beng" typeface="Vrinda"/>
+        <a:font script="Gujr" typeface="Shruti"/>
+        <a:font script="Khmr" typeface="DaunPenh"/>
+        <a:font script="Knda" typeface="Tunga"/>
+        <a:font script="Guru" typeface="Raavi"/>
+        <a:font script="Cans" typeface="Euphemia"/>
+        <a:font script="Cher" typeface="Plantagenet Cherokee"/>
+        <a:font script="Yiii" typeface="Microsoft Yi Baiti"/>
+        <a:font script="Tibt" typeface="Microsoft Himalaya"/>
+        <a:font script="Thaa" typeface="MV Boli"/>
+        <a:font script="Deva" typeface="Mangal"/>
+        <a:font script="Telu" typeface="Gautami"/>
+        <a:font script="Taml" typeface="Latha"/>
+        <a:font script="Syrc" typeface="Estrangelo Edessa"/>
+        <a:font script="Orya" typeface="Kalinga"/>
+        <a:font script="Mlym" typeface="Kartika"/>
+        <a:font script="Laoo" typeface="DokChampa"/>
+        <a:font script="Sinh" typeface="Iskoola Pota"/>
+        <a:font script="Mong" typeface="Mongolian Baiti"/>
+        <a:font script="Viet" typeface="Arial"/>
+        <a:font script="Uigh" typeface="Microsoft Uighur"/>
+        <a:font script="Geor" typeface="Sylfaen"/>
+      </a:minorFont>
+    </a:fontScheme>
+    <a:fmtScheme name="Office">
+      <a:fillStyleLst>
+        <a:solidFill>
+          <a:schemeClr val="phClr"/>
+        </a:solidFill>
+        <a:gradFill rotWithShape="1">
+          <a:gsLst>
+            <a:gs pos="0">
+              <a:schemeClr val="phClr">
+                <a:tint val="50000"/>
+                <a:satMod val="300000"/>
+              </a:schemeClr>
+            </a:gs>
+            <a:gs pos="35000">
+              <a:schemeClr val="phClr">
+                <a:tint val="37000"/>
+                <a:satMod val="300000"/>
+              </a:schemeClr>
+            </a:gs>
+            <a:gs pos="100000">
+              <a:schemeClr val="phClr">
+                <a:tint val="15000"/>
+                <a:satMod val="350000"/>
+              </a:schemeClr>
+            </a:gs>
+          </a:gsLst>
+          <a:lin ang="16200000" scaled="1"/>
+        </a:gradFill>
+        <a:gradFill rotWithShape="1">
+          <a:gsLst>
+            <a:gs pos="0">
+              <a:schemeClr val="phClr">
+                <a:tint val="100000"/>
+                <a:shade val="100000"/>
+                <a:satMod val="130000"/>
+              </a:schemeClr>
+            </a:gs>
+            <a:gs pos="100000">
+              <a:schemeClr val="phClr">
+                <a:tint val="50000"/>
+                <a:shade val="100000"/>
+                <a:satMod val="350000"/>
+              </a:schemeClr>
+            </a:gs>
+          </a:gsLst>
+          <a:lin ang="16200000" scaled="0"/>
+        </a:gradFill>
+      </a:fillStyleLst>
+      <a:lnStyleLst>
+        <a:ln w="9525" cap="flat" cmpd="sng" algn="ctr">
+          <a:solidFill>
+            <a:schemeClr val="phClr">
+              <a:shade val="95000"/>
+              <a:satMod val="105000"/>
+            </a:schemeClr>
+          </a:solidFill>
+          <a:prstDash val="solid"/>
+        </a:ln>
+        <a:ln w="25400" cap="flat" cmpd="sng" algn="ctr">
+          <a:solidFill>
+            <a:schemeClr val="phClr"/>
+          </a:solidFill>
+          <a:prstDash val="solid"/>
+        </a:ln>
+        <a:ln w="38100" cap="flat" cmpd="sng" algn="ctr">
+          <a:solidFill>
+            <a:schemeClr val="phClr"/>
+          </a:solidFill>
+          <a:prstDash val="solid"/>
+        </a:ln>
+      </a:lnStyleLst>
+      <a:effectStyleLst>
+        <a:effectStyle>
+          <a:effectLst>
+            <a:outerShdw blurRad="40000" dist="20000" dir="5400000" rotWithShape="0">
+              <a:srgbClr val="000000">
+                <a:alpha val="38000"/>
+              </a:srgbClr>
+            </a:outerShdw>
+          </a:effectLst>
+        </a:effectStyle>
+        <a:effectStyle>
+          <a:effectLst>
+            <a:outerShdw blurRad="40000" dist="23000" dir="5400000" rotWithShape="0">
+              <a:srgbClr val="000000">
+                <a:alpha val="35000"/>
+              </a:srgbClr>
+            </a:outerShdw>
+          </a:effectLst>
+        </a:effectStyle>
+        <a:effectStyle>
+          <a:effectLst>
+            <a:outerShdw blurRad="40000" dist="23000" dir="5400000" rotWithShape="0">
+              <a:srgbClr val="000000">
+                <a:alpha val="35000"/>
+              </a:srgbClr>
+            </a:outerShdw>
+          </a:effectLst>
+          <a:scene3d>
+            <a:camera prst="orthographicFront">
+              <a:rot lat="0" lon="0" rev="0"/>
+            </a:camera>
+            <a:lightRig rig="threePt" dir="t">
+              <a:rot lat="0" lon="0" rev="1200000"/>
+            </a:lightRig>
+          </a:scene3d>
+          <a:sp3d>
+            <a:bevelT w="63500" h="25400"/>
+          </a:sp3d>
+        </a:effectStyle>
+      </a:effectStyleLst>
+      <a:bgFillStyleLst>
+        <a:solidFill>
+          <a:schemeClr val="phClr"/>
+        </a:solidFill>
+        <a:gradFill rotWithShape="1">
+          <a:gsLst>
+            <a:gs pos="0">
+              <a:schemeClr val="phClr">
+                <a:tint val="40000"/>
+                <a:satMod val="350000"/>
+              </a:schemeClr>
+            </a:gs>
+            <a:gs pos="40000">
+              <a:schemeClr val="phClr">
+                <a:tint val="45000"/>
+                <a:shade val="99000"/>
+                <a:satMod val="350000"/>
+              </a:schemeClr>
+            </a:gs>
+            <a:gs pos="100000">
+              <a:schemeClr val="phClr">
+                <a:shade val="20000"/>
+                <a:satMod val="255000"/>
+              </a:schemeClr>
+            </a:gs>
+          </a:gsLst>
+          <a:path path="circle">
+            <a:fillToRect l="50000" t="-80000" r="50000" b="180000"/>
+          </a:path>
+        </a:gradFill>
+        <a:gradFill rotWithShape="1">
+          <a:gsLst>
+            <a:gs pos="0">
+              <a:schemeClr val="phClr">
+                <a:tint val="80000"/>
+                <a:satMod val="300000"/>
+              </a:schemeClr>
+            </a:gs>
+            <a:gs pos="100000">
+              <a:schemeClr val="phClr">
+                <a:shade val="30000"/>
+                <a:satMod val="200000"/>
+              </a:schemeClr>
+            </a:gs>
+          </a:gsLst>
+          <a:path path="circle">
+            <a:fillToRect l="50000" t="50000" r="50000" b="50000"/>
+          </a:path>
+        </a:gradFill>
+      </a:bgFillStyleLst>
+    </a:fmtScheme>
+  </a:themeElements>
+</a:theme>
+</file>
+
+<file path=ppt/theme/theme3.xml><?xml version="1.0" encoding="utf-8"?>
 <a:theme xmlns:a="http://schemas.openxmlformats.org/drawingml/2006/main" xmlns:r="http://schemas.openxmlformats.org/officeDocument/2006/relationships" name="Office Theme">
   <a:themeElements>
     <a:clrScheme name="Office">
@@ -16588,283 +17046,4 @@
     </a:fmtScheme>
   </a:themeElements>
 </a:theme>
-</file>
-
-<file path=ppt/theme/theme3.xml><?xml version="1.0" encoding="utf-8"?>
-<a:theme xmlns:a="http://schemas.openxmlformats.org/drawingml/2006/main" xmlns:r="http://schemas.openxmlformats.org/officeDocument/2006/relationships" name="ELIXIR_template">
-  <a:themeElements>
-    <a:clrScheme name="Executive">
-      <a:dk1>
-        <a:srgbClr val="000000"/>
-      </a:dk1>
-      <a:lt1>
-        <a:srgbClr val="FFFFFF"/>
-      </a:lt1>
-      <a:dk2>
-        <a:srgbClr val="2F5897"/>
-      </a:dk2>
-      <a:lt2>
-        <a:srgbClr val="E4E9EF"/>
-      </a:lt2>
-      <a:accent1>
-        <a:srgbClr val="6076B4"/>
-      </a:accent1>
-      <a:accent2>
-        <a:srgbClr val="9C5252"/>
-      </a:accent2>
-      <a:accent3>
-        <a:srgbClr val="E68422"/>
-      </a:accent3>
-      <a:accent4>
-        <a:srgbClr val="846648"/>
-      </a:accent4>
-      <a:accent5>
-        <a:srgbClr val="63891F"/>
-      </a:accent5>
-      <a:accent6>
-        <a:srgbClr val="758085"/>
-      </a:accent6>
-      <a:hlink>
-        <a:srgbClr val="3399FF"/>
-      </a:hlink>
-      <a:folHlink>
-        <a:srgbClr val="B2B2B2"/>
-      </a:folHlink>
-    </a:clrScheme>
-    <a:fontScheme name="Office">
-      <a:majorFont>
-        <a:latin typeface="Arial"/>
-        <a:ea typeface=""/>
-        <a:cs typeface=""/>
-        <a:font script="Jpan" typeface="ＭＳ Ｐゴシック"/>
-        <a:font script="Hang" typeface="맑은 고딕"/>
-        <a:font script="Hans" typeface="宋体"/>
-        <a:font script="Hant" typeface="新細明體"/>
-        <a:font script="Arab" typeface="Times New Roman"/>
-        <a:font script="Hebr" typeface="Times New Roman"/>
-        <a:font script="Thai" typeface="Angsana New"/>
-        <a:font script="Ethi" typeface="Nyala"/>
-        <a:font script="Beng" typeface="Vrinda"/>
-        <a:font script="Gujr" typeface="Shruti"/>
-        <a:font script="Khmr" typeface="MoolBoran"/>
-        <a:font script="Knda" typeface="Tunga"/>
-        <a:font script="Guru" typeface="Raavi"/>
-        <a:font script="Cans" typeface="Euphemia"/>
-        <a:font script="Cher" typeface="Plantagenet Cherokee"/>
-        <a:font script="Yiii" typeface="Microsoft Yi Baiti"/>
-        <a:font script="Tibt" typeface="Microsoft Himalaya"/>
-        <a:font script="Thaa" typeface="MV Boli"/>
-        <a:font script="Deva" typeface="Mangal"/>
-        <a:font script="Telu" typeface="Gautami"/>
-        <a:font script="Taml" typeface="Latha"/>
-        <a:font script="Syrc" typeface="Estrangelo Edessa"/>
-        <a:font script="Orya" typeface="Kalinga"/>
-        <a:font script="Mlym" typeface="Kartika"/>
-        <a:font script="Laoo" typeface="DokChampa"/>
-        <a:font script="Sinh" typeface="Iskoola Pota"/>
-        <a:font script="Mong" typeface="Mongolian Baiti"/>
-        <a:font script="Viet" typeface="Times New Roman"/>
-        <a:font script="Uigh" typeface="Microsoft Uighur"/>
-        <a:font script="Geor" typeface="Sylfaen"/>
-      </a:majorFont>
-      <a:minorFont>
-        <a:latin typeface="Arial"/>
-        <a:ea typeface=""/>
-        <a:cs typeface=""/>
-        <a:font script="Jpan" typeface="ＭＳ Ｐゴシック"/>
-        <a:font script="Hang" typeface="맑은 고딕"/>
-        <a:font script="Hans" typeface="宋体"/>
-        <a:font script="Hant" typeface="新細明體"/>
-        <a:font script="Arab" typeface="Arial"/>
-        <a:font script="Hebr" typeface="Arial"/>
-        <a:font script="Thai" typeface="Cordia New"/>
-        <a:font script="Ethi" typeface="Nyala"/>
-        <a:font script="Beng" typeface="Vrinda"/>
-        <a:font script="Gujr" typeface="Shruti"/>
-        <a:font script="Khmr" typeface="DaunPenh"/>
-        <a:font script="Knda" typeface="Tunga"/>
-        <a:font script="Guru" typeface="Raavi"/>
-        <a:font script="Cans" typeface="Euphemia"/>
-        <a:font script="Cher" typeface="Plantagenet Cherokee"/>
-        <a:font script="Yiii" typeface="Microsoft Yi Baiti"/>
-        <a:font script="Tibt" typeface="Microsoft Himalaya"/>
-        <a:font script="Thaa" typeface="MV Boli"/>
-        <a:font script="Deva" typeface="Mangal"/>
-        <a:font script="Telu" typeface="Gautami"/>
-        <a:font script="Taml" typeface="Latha"/>
-        <a:font script="Syrc" typeface="Estrangelo Edessa"/>
-        <a:font script="Orya" typeface="Kalinga"/>
-        <a:font script="Mlym" typeface="Kartika"/>
-        <a:font script="Laoo" typeface="DokChampa"/>
-        <a:font script="Sinh" typeface="Iskoola Pota"/>
-        <a:font script="Mong" typeface="Mongolian Baiti"/>
-        <a:font script="Viet" typeface="Arial"/>
-        <a:font script="Uigh" typeface="Microsoft Uighur"/>
-        <a:font script="Geor" typeface="Sylfaen"/>
-      </a:minorFont>
-    </a:fontScheme>
-    <a:fmtScheme name="Office">
-      <a:fillStyleLst>
-        <a:solidFill>
-          <a:schemeClr val="phClr"/>
-        </a:solidFill>
-        <a:gradFill rotWithShape="1">
-          <a:gsLst>
-            <a:gs pos="0">
-              <a:schemeClr val="phClr">
-                <a:tint val="50000"/>
-                <a:satMod val="300000"/>
-              </a:schemeClr>
-            </a:gs>
-            <a:gs pos="35000">
-              <a:schemeClr val="phClr">
-                <a:tint val="37000"/>
-                <a:satMod val="300000"/>
-              </a:schemeClr>
-            </a:gs>
-            <a:gs pos="100000">
-              <a:schemeClr val="phClr">
-                <a:tint val="15000"/>
-                <a:satMod val="350000"/>
-              </a:schemeClr>
-            </a:gs>
-          </a:gsLst>
-          <a:lin ang="16200000" scaled="1"/>
-        </a:gradFill>
-        <a:gradFill rotWithShape="1">
-          <a:gsLst>
-            <a:gs pos="0">
-              <a:schemeClr val="phClr">
-                <a:tint val="100000"/>
-                <a:shade val="100000"/>
-                <a:satMod val="130000"/>
-              </a:schemeClr>
-            </a:gs>
-            <a:gs pos="100000">
-              <a:schemeClr val="phClr">
-                <a:tint val="50000"/>
-                <a:shade val="100000"/>
-                <a:satMod val="350000"/>
-              </a:schemeClr>
-            </a:gs>
-          </a:gsLst>
-          <a:lin ang="16200000" scaled="0"/>
-        </a:gradFill>
-      </a:fillStyleLst>
-      <a:lnStyleLst>
-        <a:ln w="9525" cap="flat" cmpd="sng" algn="ctr">
-          <a:solidFill>
-            <a:schemeClr val="phClr">
-              <a:shade val="95000"/>
-              <a:satMod val="105000"/>
-            </a:schemeClr>
-          </a:solidFill>
-          <a:prstDash val="solid"/>
-        </a:ln>
-        <a:ln w="25400" cap="flat" cmpd="sng" algn="ctr">
-          <a:solidFill>
-            <a:schemeClr val="phClr"/>
-          </a:solidFill>
-          <a:prstDash val="solid"/>
-        </a:ln>
-        <a:ln w="38100" cap="flat" cmpd="sng" algn="ctr">
-          <a:solidFill>
-            <a:schemeClr val="phClr"/>
-          </a:solidFill>
-          <a:prstDash val="solid"/>
-        </a:ln>
-      </a:lnStyleLst>
-      <a:effectStyleLst>
-        <a:effectStyle>
-          <a:effectLst>
-            <a:outerShdw blurRad="40000" dist="20000" dir="5400000" rotWithShape="0">
-              <a:srgbClr val="000000">
-                <a:alpha val="38000"/>
-              </a:srgbClr>
-            </a:outerShdw>
-          </a:effectLst>
-        </a:effectStyle>
-        <a:effectStyle>
-          <a:effectLst>
-            <a:outerShdw blurRad="40000" dist="23000" dir="5400000" rotWithShape="0">
-              <a:srgbClr val="000000">
-                <a:alpha val="35000"/>
-              </a:srgbClr>
-            </a:outerShdw>
-          </a:effectLst>
-        </a:effectStyle>
-        <a:effectStyle>
-          <a:effectLst>
-            <a:outerShdw blurRad="40000" dist="23000" dir="5400000" rotWithShape="0">
-              <a:srgbClr val="000000">
-                <a:alpha val="35000"/>
-              </a:srgbClr>
-            </a:outerShdw>
-          </a:effectLst>
-          <a:scene3d>
-            <a:camera prst="orthographicFront">
-              <a:rot lat="0" lon="0" rev="0"/>
-            </a:camera>
-            <a:lightRig rig="threePt" dir="t">
-              <a:rot lat="0" lon="0" rev="1200000"/>
-            </a:lightRig>
-          </a:scene3d>
-          <a:sp3d>
-            <a:bevelT w="63500" h="25400"/>
-          </a:sp3d>
-        </a:effectStyle>
-      </a:effectStyleLst>
-      <a:bgFillStyleLst>
-        <a:solidFill>
-          <a:schemeClr val="phClr"/>
-        </a:solidFill>
-        <a:gradFill rotWithShape="1">
-          <a:gsLst>
-            <a:gs pos="0">
-              <a:schemeClr val="phClr">
-                <a:tint val="40000"/>
-                <a:satMod val="350000"/>
-              </a:schemeClr>
-            </a:gs>
-            <a:gs pos="40000">
-              <a:schemeClr val="phClr">
-                <a:tint val="45000"/>
-                <a:shade val="99000"/>
-                <a:satMod val="350000"/>
-              </a:schemeClr>
-            </a:gs>
-            <a:gs pos="100000">
-              <a:schemeClr val="phClr">
-                <a:shade val="20000"/>
-                <a:satMod val="255000"/>
-              </a:schemeClr>
-            </a:gs>
-          </a:gsLst>
-          <a:path path="circle">
-            <a:fillToRect l="50000" t="-80000" r="50000" b="180000"/>
-          </a:path>
-        </a:gradFill>
-        <a:gradFill rotWithShape="1">
-          <a:gsLst>
-            <a:gs pos="0">
-              <a:schemeClr val="phClr">
-                <a:tint val="80000"/>
-                <a:satMod val="300000"/>
-              </a:schemeClr>
-            </a:gs>
-            <a:gs pos="100000">
-              <a:schemeClr val="phClr">
-                <a:shade val="30000"/>
-                <a:satMod val="200000"/>
-              </a:schemeClr>
-            </a:gs>
-          </a:gsLst>
-          <a:path path="circle">
-            <a:fillToRect l="50000" t="50000" r="50000" b="50000"/>
-          </a:path>
-        </a:gradFill>
-      </a:bgFillStyleLst>
-    </a:fmtScheme>
-  </a:themeElements>
-</a:theme>
 </file>
</xml_diff>